<commit_message>
Update for presentation and some bugfixes. Also documentation
</commit_message>
<xml_diff>
--- a/Presentations/infovis intermediate presentation.pptx
+++ b/Presentations/infovis intermediate presentation.pptx
@@ -852,6 +852,375 @@
     <p:extLst>
       <p:ext uri="{BB962C8B-B14F-4D97-AF65-F5344CB8AC3E}">
         <p14:creationId xmlns:p14="http://schemas.microsoft.com/office/powerpoint/2010/main" val="2795077521"/>
+      </p:ext>
+    </p:extLst>
+  </p:cSld>
+  <p:clrMapOvr>
+    <a:masterClrMapping/>
+  </p:clrMapOvr>
+</p:notes>
+</file>
+
+<file path=ppt/notesSlides/notesSlide3.xml><?xml version="1.0" encoding="utf-8"?>
+<p:notes xmlns:a="http://schemas.openxmlformats.org/drawingml/2006/main" xmlns:r="http://schemas.openxmlformats.org/officeDocument/2006/relationships" xmlns:p="http://schemas.openxmlformats.org/presentationml/2006/main">
+  <p:cSld>
+    <p:spTree>
+      <p:nvGrpSpPr>
+        <p:cNvPr id="1" name=""/>
+        <p:cNvGrpSpPr/>
+        <p:nvPr/>
+      </p:nvGrpSpPr>
+      <p:grpSpPr>
+        <a:xfrm>
+          <a:off x="0" y="0"/>
+          <a:ext cx="0" cy="0"/>
+          <a:chOff x="0" y="0"/>
+          <a:chExt cx="0" cy="0"/>
+        </a:xfrm>
+      </p:grpSpPr>
+      <p:sp>
+        <p:nvSpPr>
+          <p:cNvPr id="2" name="Tijdelijke aanduiding voor dia-afbeelding 1"/>
+          <p:cNvSpPr>
+            <a:spLocks noGrp="1" noRot="1" noChangeAspect="1"/>
+          </p:cNvSpPr>
+          <p:nvPr>
+            <p:ph type="sldImg"/>
+          </p:nvPr>
+        </p:nvSpPr>
+        <p:spPr/>
+      </p:sp>
+      <p:sp>
+        <p:nvSpPr>
+          <p:cNvPr id="3" name="Tijdelijke aanduiding voor notities 2"/>
+          <p:cNvSpPr>
+            <a:spLocks noGrp="1"/>
+          </p:cNvSpPr>
+          <p:nvPr>
+            <p:ph type="body" idx="1"/>
+          </p:nvPr>
+        </p:nvSpPr>
+        <p:spPr/>
+        <p:txBody>
+          <a:bodyPr/>
+          <a:lstStyle/>
+          <a:p>
+            <a:r>
+              <a:rPr lang="nl-BE" dirty="0"/>
+              <a:t>Midas</a:t>
+            </a:r>
+          </a:p>
+        </p:txBody>
+      </p:sp>
+      <p:sp>
+        <p:nvSpPr>
+          <p:cNvPr id="4" name="Tijdelijke aanduiding voor dianummer 3"/>
+          <p:cNvSpPr>
+            <a:spLocks noGrp="1"/>
+          </p:cNvSpPr>
+          <p:nvPr>
+            <p:ph type="sldNum" sz="quarter" idx="10"/>
+          </p:nvPr>
+        </p:nvSpPr>
+        <p:spPr/>
+        <p:txBody>
+          <a:bodyPr/>
+          <a:lstStyle/>
+          <a:p>
+            <a:fld id="{8954E32A-327F-AF4B-8E1F-209FBF93D26D}" type="slidenum">
+              <a:rPr lang="nl-NL" smtClean="0"/>
+              <a:t>11</a:t>
+            </a:fld>
+            <a:endParaRPr lang="nl-NL"/>
+          </a:p>
+        </p:txBody>
+      </p:sp>
+    </p:spTree>
+    <p:extLst>
+      <p:ext uri="{BB962C8B-B14F-4D97-AF65-F5344CB8AC3E}">
+        <p14:creationId xmlns:p14="http://schemas.microsoft.com/office/powerpoint/2010/main" val="3287781673"/>
+      </p:ext>
+    </p:extLst>
+  </p:cSld>
+  <p:clrMapOvr>
+    <a:masterClrMapping/>
+  </p:clrMapOvr>
+</p:notes>
+</file>
+
+<file path=ppt/notesSlides/notesSlide4.xml><?xml version="1.0" encoding="utf-8"?>
+<p:notes xmlns:a="http://schemas.openxmlformats.org/drawingml/2006/main" xmlns:r="http://schemas.openxmlformats.org/officeDocument/2006/relationships" xmlns:p="http://schemas.openxmlformats.org/presentationml/2006/main">
+  <p:cSld>
+    <p:spTree>
+      <p:nvGrpSpPr>
+        <p:cNvPr id="1" name=""/>
+        <p:cNvGrpSpPr/>
+        <p:nvPr/>
+      </p:nvGrpSpPr>
+      <p:grpSpPr>
+        <a:xfrm>
+          <a:off x="0" y="0"/>
+          <a:ext cx="0" cy="0"/>
+          <a:chOff x="0" y="0"/>
+          <a:chExt cx="0" cy="0"/>
+        </a:xfrm>
+      </p:grpSpPr>
+      <p:sp>
+        <p:nvSpPr>
+          <p:cNvPr id="2" name="Tijdelijke aanduiding voor dia-afbeelding 1"/>
+          <p:cNvSpPr>
+            <a:spLocks noGrp="1" noRot="1" noChangeAspect="1"/>
+          </p:cNvSpPr>
+          <p:nvPr>
+            <p:ph type="sldImg"/>
+          </p:nvPr>
+        </p:nvSpPr>
+        <p:spPr/>
+      </p:sp>
+      <p:sp>
+        <p:nvSpPr>
+          <p:cNvPr id="3" name="Tijdelijke aanduiding voor notities 2"/>
+          <p:cNvSpPr>
+            <a:spLocks noGrp="1"/>
+          </p:cNvSpPr>
+          <p:nvPr>
+            <p:ph type="body" idx="1"/>
+          </p:nvPr>
+        </p:nvSpPr>
+        <p:spPr/>
+        <p:txBody>
+          <a:bodyPr/>
+          <a:lstStyle/>
+          <a:p>
+            <a:r>
+              <a:rPr lang="nl-BE" dirty="0"/>
+              <a:t>Midas</a:t>
+            </a:r>
+          </a:p>
+        </p:txBody>
+      </p:sp>
+      <p:sp>
+        <p:nvSpPr>
+          <p:cNvPr id="4" name="Tijdelijke aanduiding voor dianummer 3"/>
+          <p:cNvSpPr>
+            <a:spLocks noGrp="1"/>
+          </p:cNvSpPr>
+          <p:nvPr>
+            <p:ph type="sldNum" sz="quarter" idx="10"/>
+          </p:nvPr>
+        </p:nvSpPr>
+        <p:spPr/>
+        <p:txBody>
+          <a:bodyPr/>
+          <a:lstStyle/>
+          <a:p>
+            <a:fld id="{8954E32A-327F-AF4B-8E1F-209FBF93D26D}" type="slidenum">
+              <a:rPr lang="nl-NL" smtClean="0"/>
+              <a:t>12</a:t>
+            </a:fld>
+            <a:endParaRPr lang="nl-NL"/>
+          </a:p>
+        </p:txBody>
+      </p:sp>
+    </p:spTree>
+    <p:extLst>
+      <p:ext uri="{BB962C8B-B14F-4D97-AF65-F5344CB8AC3E}">
+        <p14:creationId xmlns:p14="http://schemas.microsoft.com/office/powerpoint/2010/main" val="3984593474"/>
+      </p:ext>
+    </p:extLst>
+  </p:cSld>
+  <p:clrMapOvr>
+    <a:masterClrMapping/>
+  </p:clrMapOvr>
+</p:notes>
+</file>
+
+<file path=ppt/notesSlides/notesSlide5.xml><?xml version="1.0" encoding="utf-8"?>
+<p:notes xmlns:a="http://schemas.openxmlformats.org/drawingml/2006/main" xmlns:r="http://schemas.openxmlformats.org/officeDocument/2006/relationships" xmlns:p="http://schemas.openxmlformats.org/presentationml/2006/main">
+  <p:cSld>
+    <p:spTree>
+      <p:nvGrpSpPr>
+        <p:cNvPr id="1" name=""/>
+        <p:cNvGrpSpPr/>
+        <p:nvPr/>
+      </p:nvGrpSpPr>
+      <p:grpSpPr>
+        <a:xfrm>
+          <a:off x="0" y="0"/>
+          <a:ext cx="0" cy="0"/>
+          <a:chOff x="0" y="0"/>
+          <a:chExt cx="0" cy="0"/>
+        </a:xfrm>
+      </p:grpSpPr>
+      <p:sp>
+        <p:nvSpPr>
+          <p:cNvPr id="2" name="Tijdelijke aanduiding voor dia-afbeelding 1"/>
+          <p:cNvSpPr>
+            <a:spLocks noGrp="1" noRot="1" noChangeAspect="1"/>
+          </p:cNvSpPr>
+          <p:nvPr>
+            <p:ph type="sldImg"/>
+          </p:nvPr>
+        </p:nvSpPr>
+        <p:spPr/>
+      </p:sp>
+      <p:sp>
+        <p:nvSpPr>
+          <p:cNvPr id="3" name="Tijdelijke aanduiding voor notities 2"/>
+          <p:cNvSpPr>
+            <a:spLocks noGrp="1"/>
+          </p:cNvSpPr>
+          <p:nvPr>
+            <p:ph type="body" idx="1"/>
+          </p:nvPr>
+        </p:nvSpPr>
+        <p:spPr/>
+        <p:txBody>
+          <a:bodyPr/>
+          <a:lstStyle/>
+          <a:p>
+            <a:r>
+              <a:rPr lang="nl-BE" dirty="0"/>
+              <a:t>Midas</a:t>
+            </a:r>
+          </a:p>
+          <a:p>
+            <a:r>
+              <a:rPr lang="nl-BE" dirty="0" err="1"/>
+              <a:t>To</a:t>
+            </a:r>
+            <a:r>
+              <a:rPr lang="nl-BE" dirty="0"/>
+              <a:t> show: </a:t>
+            </a:r>
+          </a:p>
+          <a:p>
+            <a:r>
+              <a:rPr lang="nl-BE" dirty="0"/>
+              <a:t>story() //Hier zien we een uitschieter</a:t>
+            </a:r>
+          </a:p>
+          <a:p>
+            <a:r>
+              <a:rPr lang="nl-BE" dirty="0"/>
+              <a:t>Story() // Filteren op wanneer hij </a:t>
+            </a:r>
+            <a:r>
+              <a:rPr lang="nl-BE" dirty="0" err="1"/>
+              <a:t>sochtends</a:t>
+            </a:r>
+            <a:r>
+              <a:rPr lang="nl-BE" dirty="0"/>
+              <a:t> vertrekt</a:t>
+            </a:r>
+          </a:p>
+          <a:p>
+            <a:r>
+              <a:rPr lang="nl-BE" dirty="0"/>
+              <a:t>Story() // Filteren wanneer hij aankomt</a:t>
+            </a:r>
+          </a:p>
+          <a:p>
+            <a:r>
+              <a:rPr lang="nl-BE" dirty="0"/>
+              <a:t>Story() // Nieuwe map </a:t>
+            </a:r>
+            <a:r>
+              <a:rPr lang="nl-BE" dirty="0" err="1"/>
+              <a:t>layer</a:t>
+            </a:r>
+            <a:r>
+              <a:rPr lang="nl-BE" dirty="0"/>
+              <a:t> om eenrichtingsverkeer te zien.</a:t>
+            </a:r>
+          </a:p>
+          <a:p>
+            <a:r>
+              <a:rPr lang="nl-BE" dirty="0"/>
+              <a:t>// </a:t>
+            </a:r>
+            <a:r>
+              <a:rPr lang="nl-BE" dirty="0" err="1"/>
+              <a:t>Reload</a:t>
+            </a:r>
+            <a:endParaRPr lang="nl-BE" dirty="0"/>
+          </a:p>
+          <a:p>
+            <a:r>
+              <a:rPr lang="nl-BE" dirty="0"/>
+              <a:t>storyFilter3() // Wegen die bij hem thuis vertrekken</a:t>
+            </a:r>
+          </a:p>
+          <a:p>
+            <a:r>
+              <a:rPr lang="nl-BE" dirty="0"/>
+              <a:t>storyFilter4() // Wegen die bij hem thuis aankomen</a:t>
+            </a:r>
+          </a:p>
+          <a:p>
+            <a:endParaRPr lang="nl-BE" dirty="0"/>
+          </a:p>
+          <a:p>
+            <a:r>
+              <a:rPr lang="nl-BE" dirty="0"/>
+              <a:t>// </a:t>
+            </a:r>
+            <a:r>
+              <a:rPr lang="nl-BE" dirty="0" err="1"/>
+              <a:t>Reload</a:t>
+            </a:r>
+            <a:r>
+              <a:rPr lang="nl-BE" dirty="0"/>
+              <a:t> en ga naar </a:t>
+            </a:r>
+            <a:r>
+              <a:rPr lang="nl-BE" dirty="0" err="1"/>
+              <a:t>boudewijnstraat</a:t>
+            </a:r>
+            <a:r>
+              <a:rPr lang="nl-BE" dirty="0"/>
+              <a:t> (driehoek)</a:t>
+            </a:r>
+          </a:p>
+          <a:p>
+            <a:r>
+              <a:rPr lang="nl-BE" dirty="0" err="1"/>
+              <a:t>Filter.startOrStopNear</a:t>
+            </a:r>
+            <a:r>
+              <a:rPr lang="nl-BE" dirty="0"/>
+              <a:t>([51.205171, 4.398712], 100)</a:t>
+            </a:r>
+          </a:p>
+        </p:txBody>
+      </p:sp>
+      <p:sp>
+        <p:nvSpPr>
+          <p:cNvPr id="4" name="Tijdelijke aanduiding voor dianummer 3"/>
+          <p:cNvSpPr>
+            <a:spLocks noGrp="1"/>
+          </p:cNvSpPr>
+          <p:nvPr>
+            <p:ph type="sldNum" sz="quarter" idx="10"/>
+          </p:nvPr>
+        </p:nvSpPr>
+        <p:spPr/>
+        <p:txBody>
+          <a:bodyPr/>
+          <a:lstStyle/>
+          <a:p>
+            <a:fld id="{8954E32A-327F-AF4B-8E1F-209FBF93D26D}" type="slidenum">
+              <a:rPr lang="nl-NL" smtClean="0"/>
+              <a:t>17</a:t>
+            </a:fld>
+            <a:endParaRPr lang="nl-NL"/>
+          </a:p>
+        </p:txBody>
+      </p:sp>
+    </p:spTree>
+    <p:extLst>
+      <p:ext uri="{BB962C8B-B14F-4D97-AF65-F5344CB8AC3E}">
+        <p14:creationId xmlns:p14="http://schemas.microsoft.com/office/powerpoint/2010/main" val="1029509177"/>
       </p:ext>
     </p:extLst>
   </p:cSld>
@@ -5910,46 +6279,6 @@
       </p:sp>
       <p:sp>
         <p:nvSpPr>
-          <p:cNvPr id="6" name="Rectangle 5">
-            <a:extLst>
-              <a:ext uri="{FF2B5EF4-FFF2-40B4-BE49-F238E27FC236}">
-                <a16:creationId xmlns:a16="http://schemas.microsoft.com/office/drawing/2014/main" id="{43F5049D-F45D-A746-AF79-25BB107C99C6}"/>
-              </a:ext>
-            </a:extLst>
-          </p:cNvPr>
-          <p:cNvSpPr/>
-          <p:nvPr/>
-        </p:nvSpPr>
-        <p:spPr>
-          <a:xfrm>
-            <a:off x="576000" y="1391676"/>
-            <a:ext cx="11041200" cy="830997"/>
-          </a:xfrm>
-          <a:prstGeom prst="rect">
-            <a:avLst/>
-          </a:prstGeom>
-        </p:spPr>
-        <p:txBody>
-          <a:bodyPr wrap="square">
-            <a:spAutoFit/>
-          </a:bodyPr>
-          <a:lstStyle/>
-          <a:p>
-            <a:r>
-              <a:rPr lang="en-US" sz="2400" dirty="0"/>
-              <a:t>What are other works that are inspirational to your design? </a:t>
-            </a:r>
-          </a:p>
-          <a:p>
-            <a:r>
-              <a:rPr lang="en-US" sz="2400" dirty="0"/>
-              <a:t>How might they inspire your design?</a:t>
-            </a:r>
-          </a:p>
-        </p:txBody>
-      </p:sp>
-      <p:sp>
-        <p:nvSpPr>
           <p:cNvPr id="8" name="Rectangle 7">
             <a:extLst>
               <a:ext uri="{FF2B5EF4-FFF2-40B4-BE49-F238E27FC236}">
@@ -5962,7 +6291,7 @@
         </p:nvSpPr>
         <p:spPr>
           <a:xfrm>
-            <a:off x="1026806" y="4745176"/>
+            <a:off x="1026806" y="4168127"/>
             <a:ext cx="2421788" cy="276999"/>
           </a:xfrm>
           <a:prstGeom prst="rect">
@@ -6000,7 +6329,7 @@
         </p:nvSpPr>
         <p:spPr>
           <a:xfrm>
-            <a:off x="637800" y="2414147"/>
+            <a:off x="637800" y="1837098"/>
             <a:ext cx="3533606" cy="599019"/>
           </a:xfrm>
         </p:spPr>
@@ -6048,14 +6377,14 @@
           <p:nvPr/>
         </p:nvPicPr>
         <p:blipFill>
-          <a:blip r:embed="rId2"/>
+          <a:blip r:embed="rId3"/>
           <a:stretch>
             <a:fillRect/>
           </a:stretch>
         </p:blipFill>
         <p:spPr>
           <a:xfrm>
-            <a:off x="728799" y="2875021"/>
+            <a:off x="728799" y="2297972"/>
             <a:ext cx="3155224" cy="1818505"/>
           </a:xfrm>
           <a:prstGeom prst="rect">
@@ -6077,7 +6406,7 @@
         </p:nvSpPr>
         <p:spPr>
           <a:xfrm>
-            <a:off x="566191" y="5234841"/>
+            <a:off x="566191" y="4657792"/>
             <a:ext cx="3480440" cy="369332"/>
           </a:xfrm>
           <a:prstGeom prst="rect">
@@ -6114,6 +6443,392 @@
             <a:r>
               <a:rPr lang="nl-BE" dirty="0"/>
               <a:t> points</a:t>
+            </a:r>
+          </a:p>
+        </p:txBody>
+      </p:sp>
+      <p:sp>
+        <p:nvSpPr>
+          <p:cNvPr id="10" name="Tijdelijke aanduiding voor inhoud 6">
+            <a:extLst>
+              <a:ext uri="{FF2B5EF4-FFF2-40B4-BE49-F238E27FC236}">
+                <a16:creationId xmlns:a16="http://schemas.microsoft.com/office/drawing/2014/main" id="{071CE5A3-3CE4-4E4E-B315-12135CC02FED}"/>
+              </a:ext>
+            </a:extLst>
+          </p:cNvPr>
+          <p:cNvSpPr txBox="1">
+            <a:spLocks/>
+          </p:cNvSpPr>
+          <p:nvPr/>
+        </p:nvSpPr>
+        <p:spPr>
+          <a:xfrm>
+            <a:off x="4323805" y="1837098"/>
+            <a:ext cx="3941305" cy="599019"/>
+          </a:xfrm>
+          <a:prstGeom prst="rect">
+            <a:avLst/>
+          </a:prstGeom>
+        </p:spPr>
+        <p:txBody>
+          <a:bodyPr vert="horz" lIns="91440" tIns="45720" rIns="91440" bIns="45720" rtlCol="0">
+            <a:normAutofit fontScale="92500"/>
+          </a:bodyPr>
+          <a:lstStyle>
+            <a:lvl1pPr marL="228600" indent="-228600" algn="l" defTabSz="914400" rtl="0" eaLnBrk="1" latinLnBrk="0" hangingPunct="1">
+              <a:lnSpc>
+                <a:spcPct val="100000"/>
+              </a:lnSpc>
+              <a:spcBef>
+                <a:spcPts val="1000"/>
+              </a:spcBef>
+              <a:buFont typeface="Arial"/>
+              <a:buChar char="•"/>
+              <a:defRPr sz="2400" kern="1200" baseline="0">
+                <a:solidFill>
+                  <a:schemeClr val="tx1"/>
+                </a:solidFill>
+                <a:latin typeface="Arial" charset="0"/>
+                <a:ea typeface="+mn-ea"/>
+                <a:cs typeface="+mn-cs"/>
+              </a:defRPr>
+            </a:lvl1pPr>
+            <a:lvl2pPr marL="685800" indent="-228600" algn="l" defTabSz="914400" rtl="0" eaLnBrk="1" latinLnBrk="0" hangingPunct="1">
+              <a:lnSpc>
+                <a:spcPct val="100000"/>
+              </a:lnSpc>
+              <a:spcBef>
+                <a:spcPts val="500"/>
+              </a:spcBef>
+              <a:buFont typeface="Arial"/>
+              <a:buChar char="•"/>
+              <a:defRPr sz="2400" kern="1200" baseline="0">
+                <a:solidFill>
+                  <a:schemeClr val="tx1"/>
+                </a:solidFill>
+                <a:latin typeface="Arial" charset="0"/>
+                <a:ea typeface="+mn-ea"/>
+                <a:cs typeface="+mn-cs"/>
+              </a:defRPr>
+            </a:lvl2pPr>
+            <a:lvl3pPr marL="1143000" indent="-228600" algn="l" defTabSz="914400" rtl="0" eaLnBrk="1" latinLnBrk="0" hangingPunct="1">
+              <a:lnSpc>
+                <a:spcPct val="100000"/>
+              </a:lnSpc>
+              <a:spcBef>
+                <a:spcPts val="500"/>
+              </a:spcBef>
+              <a:buFont typeface="Arial"/>
+              <a:buChar char="•"/>
+              <a:defRPr sz="2000" kern="1200" baseline="0">
+                <a:solidFill>
+                  <a:schemeClr val="tx1"/>
+                </a:solidFill>
+                <a:latin typeface="Arial" charset="0"/>
+                <a:ea typeface="+mn-ea"/>
+                <a:cs typeface="+mn-cs"/>
+              </a:defRPr>
+            </a:lvl3pPr>
+            <a:lvl4pPr marL="1600200" indent="-228600" algn="l" defTabSz="914400" rtl="0" eaLnBrk="1" latinLnBrk="0" hangingPunct="1">
+              <a:lnSpc>
+                <a:spcPct val="100000"/>
+              </a:lnSpc>
+              <a:spcBef>
+                <a:spcPts val="500"/>
+              </a:spcBef>
+              <a:buFont typeface="Arial"/>
+              <a:buChar char="•"/>
+              <a:defRPr sz="1800" kern="1200" baseline="0">
+                <a:solidFill>
+                  <a:schemeClr val="tx1"/>
+                </a:solidFill>
+                <a:latin typeface="Arial" charset="0"/>
+                <a:ea typeface="+mn-ea"/>
+                <a:cs typeface="+mn-cs"/>
+              </a:defRPr>
+            </a:lvl4pPr>
+            <a:lvl5pPr marL="2057400" indent="-228600" algn="l" defTabSz="914400" rtl="0" eaLnBrk="1" latinLnBrk="0" hangingPunct="1">
+              <a:lnSpc>
+                <a:spcPct val="100000"/>
+              </a:lnSpc>
+              <a:spcBef>
+                <a:spcPts val="500"/>
+              </a:spcBef>
+              <a:buFont typeface="Arial"/>
+              <a:buChar char="•"/>
+              <a:defRPr sz="1800" kern="1200" baseline="0">
+                <a:solidFill>
+                  <a:schemeClr val="tx1"/>
+                </a:solidFill>
+                <a:latin typeface="Arial" charset="0"/>
+                <a:ea typeface="+mn-ea"/>
+                <a:cs typeface="+mn-cs"/>
+              </a:defRPr>
+            </a:lvl5pPr>
+            <a:lvl6pPr marL="2514600" indent="-228600" algn="l" defTabSz="914400" rtl="0" eaLnBrk="1" latinLnBrk="0" hangingPunct="1">
+              <a:lnSpc>
+                <a:spcPct val="90000"/>
+              </a:lnSpc>
+              <a:spcBef>
+                <a:spcPts val="500"/>
+              </a:spcBef>
+              <a:buFont typeface="Arial"/>
+              <a:buChar char="•"/>
+              <a:defRPr sz="1800" kern="1200">
+                <a:solidFill>
+                  <a:schemeClr val="tx1"/>
+                </a:solidFill>
+                <a:latin typeface="+mn-lt"/>
+                <a:ea typeface="+mn-ea"/>
+                <a:cs typeface="+mn-cs"/>
+              </a:defRPr>
+            </a:lvl6pPr>
+            <a:lvl7pPr marL="2971800" indent="-228600" algn="l" defTabSz="914400" rtl="0" eaLnBrk="1" latinLnBrk="0" hangingPunct="1">
+              <a:lnSpc>
+                <a:spcPct val="90000"/>
+              </a:lnSpc>
+              <a:spcBef>
+                <a:spcPts val="500"/>
+              </a:spcBef>
+              <a:buFont typeface="Arial"/>
+              <a:buChar char="•"/>
+              <a:defRPr sz="1800" kern="1200">
+                <a:solidFill>
+                  <a:schemeClr val="tx1"/>
+                </a:solidFill>
+                <a:latin typeface="+mn-lt"/>
+                <a:ea typeface="+mn-ea"/>
+                <a:cs typeface="+mn-cs"/>
+              </a:defRPr>
+            </a:lvl7pPr>
+            <a:lvl8pPr marL="3429000" indent="-228600" algn="l" defTabSz="914400" rtl="0" eaLnBrk="1" latinLnBrk="0" hangingPunct="1">
+              <a:lnSpc>
+                <a:spcPct val="90000"/>
+              </a:lnSpc>
+              <a:spcBef>
+                <a:spcPts val="500"/>
+              </a:spcBef>
+              <a:buFont typeface="Arial"/>
+              <a:buChar char="•"/>
+              <a:defRPr sz="1800" kern="1200">
+                <a:solidFill>
+                  <a:schemeClr val="tx1"/>
+                </a:solidFill>
+                <a:latin typeface="+mn-lt"/>
+                <a:ea typeface="+mn-ea"/>
+                <a:cs typeface="+mn-cs"/>
+              </a:defRPr>
+            </a:lvl8pPr>
+            <a:lvl9pPr marL="3886200" indent="-228600" algn="l" defTabSz="914400" rtl="0" eaLnBrk="1" latinLnBrk="0" hangingPunct="1">
+              <a:lnSpc>
+                <a:spcPct val="90000"/>
+              </a:lnSpc>
+              <a:spcBef>
+                <a:spcPts val="500"/>
+              </a:spcBef>
+              <a:buFont typeface="Arial"/>
+              <a:buChar char="•"/>
+              <a:defRPr sz="1800" kern="1200">
+                <a:solidFill>
+                  <a:schemeClr val="tx1"/>
+                </a:solidFill>
+                <a:latin typeface="+mn-lt"/>
+                <a:ea typeface="+mn-ea"/>
+                <a:cs typeface="+mn-cs"/>
+              </a:defRPr>
+            </a:lvl9pPr>
+          </a:lstStyle>
+          <a:p>
+            <a:pPr marL="0" indent="0">
+              <a:buFont typeface="Arial"/>
+              <a:buNone/>
+            </a:pPr>
+            <a:r>
+              <a:rPr lang="nl-BE" dirty="0"/>
+              <a:t>Follow NYC Cab </a:t>
+            </a:r>
+            <a:r>
+              <a:rPr lang="nl-BE" dirty="0" err="1"/>
+              <a:t>for</a:t>
+            </a:r>
+            <a:r>
+              <a:rPr lang="nl-BE" dirty="0"/>
+              <a:t> </a:t>
+            </a:r>
+            <a:r>
+              <a:rPr lang="nl-BE" dirty="0" err="1"/>
+              <a:t>one</a:t>
+            </a:r>
+            <a:r>
+              <a:rPr lang="nl-BE" dirty="0"/>
+              <a:t> </a:t>
+            </a:r>
+            <a:r>
+              <a:rPr lang="nl-BE" dirty="0" err="1"/>
+              <a:t>day</a:t>
+            </a:r>
+            <a:endParaRPr lang="nl-BE" dirty="0"/>
+          </a:p>
+          <a:p>
+            <a:pPr marL="0" indent="0">
+              <a:buFont typeface="Arial"/>
+              <a:buNone/>
+            </a:pPr>
+            <a:endParaRPr lang="nl-BE" dirty="0"/>
+          </a:p>
+        </p:txBody>
+      </p:sp>
+      <p:pic>
+        <p:nvPicPr>
+          <p:cNvPr id="2" name="Afbeelding 1">
+            <a:extLst>
+              <a:ext uri="{FF2B5EF4-FFF2-40B4-BE49-F238E27FC236}">
+                <a16:creationId xmlns:a16="http://schemas.microsoft.com/office/drawing/2014/main" id="{A207BCA8-F050-411E-B1A3-736F18D8E9C6}"/>
+              </a:ext>
+            </a:extLst>
+          </p:cNvPr>
+          <p:cNvPicPr>
+            <a:picLocks noChangeAspect="1"/>
+          </p:cNvPicPr>
+          <p:nvPr/>
+        </p:nvPicPr>
+        <p:blipFill>
+          <a:blip r:embed="rId4"/>
+          <a:stretch>
+            <a:fillRect/>
+          </a:stretch>
+        </p:blipFill>
+        <p:spPr>
+          <a:xfrm>
+            <a:off x="4323805" y="2326920"/>
+            <a:ext cx="3721444" cy="1755947"/>
+          </a:xfrm>
+          <a:prstGeom prst="rect">
+            <a:avLst/>
+          </a:prstGeom>
+        </p:spPr>
+      </p:pic>
+      <p:sp>
+        <p:nvSpPr>
+          <p:cNvPr id="12" name="Rectangle 7">
+            <a:extLst>
+              <a:ext uri="{FF2B5EF4-FFF2-40B4-BE49-F238E27FC236}">
+                <a16:creationId xmlns:a16="http://schemas.microsoft.com/office/drawing/2014/main" id="{9BF488D9-9999-435D-8588-51A076F6B39E}"/>
+              </a:ext>
+            </a:extLst>
+          </p:cNvPr>
+          <p:cNvSpPr/>
+          <p:nvPr/>
+        </p:nvSpPr>
+        <p:spPr>
+          <a:xfrm>
+            <a:off x="4853945" y="4168127"/>
+            <a:ext cx="2661163" cy="276999"/>
+          </a:xfrm>
+          <a:prstGeom prst="rect">
+            <a:avLst/>
+          </a:prstGeom>
+        </p:spPr>
+        <p:txBody>
+          <a:bodyPr wrap="square">
+            <a:spAutoFit/>
+          </a:bodyPr>
+          <a:lstStyle/>
+          <a:p>
+            <a:r>
+              <a:rPr lang="en-US" sz="1200" dirty="0"/>
+              <a:t>http://chriswhong.github.io/nyctaxi/</a:t>
+            </a:r>
+          </a:p>
+        </p:txBody>
+      </p:sp>
+      <p:sp>
+        <p:nvSpPr>
+          <p:cNvPr id="13" name="Tekstvak 12">
+            <a:extLst>
+              <a:ext uri="{FF2B5EF4-FFF2-40B4-BE49-F238E27FC236}">
+                <a16:creationId xmlns:a16="http://schemas.microsoft.com/office/drawing/2014/main" id="{BC6A726A-0B91-4011-A610-41E293CDC8DD}"/>
+              </a:ext>
+            </a:extLst>
+          </p:cNvPr>
+          <p:cNvSpPr txBox="1"/>
+          <p:nvPr/>
+        </p:nvSpPr>
+        <p:spPr>
+          <a:xfrm>
+            <a:off x="4444306" y="4625526"/>
+            <a:ext cx="3480440" cy="646331"/>
+          </a:xfrm>
+          <a:prstGeom prst="rect">
+            <a:avLst/>
+          </a:prstGeom>
+          <a:noFill/>
+        </p:spPr>
+        <p:txBody>
+          <a:bodyPr wrap="square" rtlCol="0">
+            <a:spAutoFit/>
+          </a:bodyPr>
+          <a:lstStyle/>
+          <a:p>
+            <a:pPr algn="ctr"/>
+            <a:r>
+              <a:rPr lang="nl-BE" dirty="0" err="1"/>
+              <a:t>Highlighting</a:t>
+            </a:r>
+            <a:r>
+              <a:rPr lang="nl-BE" dirty="0"/>
+              <a:t> few </a:t>
+            </a:r>
+            <a:r>
+              <a:rPr lang="nl-BE" dirty="0" err="1"/>
+              <a:t>from</a:t>
+            </a:r>
+            <a:r>
+              <a:rPr lang="nl-BE" dirty="0"/>
+              <a:t> </a:t>
+            </a:r>
+            <a:r>
+              <a:rPr lang="nl-BE" dirty="0" err="1"/>
+              <a:t>the</a:t>
+            </a:r>
+            <a:r>
+              <a:rPr lang="nl-BE" dirty="0"/>
+              <a:t> </a:t>
+            </a:r>
+            <a:r>
+              <a:rPr lang="nl-BE" dirty="0" err="1"/>
+              <a:t>many</a:t>
+            </a:r>
+            <a:r>
+              <a:rPr lang="nl-BE" dirty="0"/>
+              <a:t> </a:t>
+            </a:r>
+          </a:p>
+          <a:p>
+            <a:pPr algn="ctr"/>
+            <a:r>
+              <a:rPr lang="nl-BE" dirty="0" err="1"/>
+              <a:t>can</a:t>
+            </a:r>
+            <a:r>
+              <a:rPr lang="nl-BE" dirty="0"/>
+              <a:t> </a:t>
+            </a:r>
+            <a:r>
+              <a:rPr lang="nl-BE" dirty="0" err="1"/>
+              <a:t>be</a:t>
+            </a:r>
+            <a:r>
+              <a:rPr lang="nl-BE" dirty="0"/>
+              <a:t> </a:t>
+            </a:r>
+            <a:r>
+              <a:rPr lang="nl-BE" dirty="0" err="1"/>
+              <a:t>very</a:t>
+            </a:r>
+            <a:r>
+              <a:rPr lang="nl-BE" dirty="0"/>
+              <a:t> interesting.</a:t>
             </a:r>
           </a:p>
         </p:txBody>
@@ -6233,35 +6948,6 @@
           </a:p>
         </p:txBody>
       </p:sp>
-      <p:pic>
-        <p:nvPicPr>
-          <p:cNvPr id="10" name="Content Placeholder 9">
-            <a:extLst>
-              <a:ext uri="{FF2B5EF4-FFF2-40B4-BE49-F238E27FC236}">
-                <a16:creationId xmlns:a16="http://schemas.microsoft.com/office/drawing/2014/main" id="{D1640C61-BBE3-BC43-8827-1297A0B097A9}"/>
-              </a:ext>
-            </a:extLst>
-          </p:cNvPr>
-          <p:cNvPicPr>
-            <a:picLocks noGrp="1" noChangeAspect="1"/>
-          </p:cNvPicPr>
-          <p:nvPr>
-            <p:ph idx="1"/>
-          </p:nvPr>
-        </p:nvPicPr>
-        <p:blipFill>
-          <a:blip r:embed="rId2"/>
-          <a:stretch>
-            <a:fillRect/>
-          </a:stretch>
-        </p:blipFill>
-        <p:spPr>
-          <a:xfrm>
-            <a:off x="576000" y="2617076"/>
-            <a:ext cx="3513389" cy="2635042"/>
-          </a:xfrm>
-        </p:spPr>
-      </p:pic>
       <p:sp>
         <p:nvSpPr>
           <p:cNvPr id="6" name="Rectangle 5">
@@ -6298,6 +6984,442 @@
             <a:r>
               <a:rPr lang="en-US" sz="2400" dirty="0"/>
               <a:t>What design decisions did you make? Based on what reasoning?</a:t>
+            </a:r>
+          </a:p>
+        </p:txBody>
+      </p:sp>
+      <p:sp>
+        <p:nvSpPr>
+          <p:cNvPr id="7" name="Tijdelijke aanduiding voor inhoud 6">
+            <a:extLst>
+              <a:ext uri="{FF2B5EF4-FFF2-40B4-BE49-F238E27FC236}">
+                <a16:creationId xmlns:a16="http://schemas.microsoft.com/office/drawing/2014/main" id="{EC6CE733-DFCD-4EAD-8AA2-A58E5767DBD4}"/>
+              </a:ext>
+            </a:extLst>
+          </p:cNvPr>
+          <p:cNvSpPr>
+            <a:spLocks noGrp="1"/>
+          </p:cNvSpPr>
+          <p:nvPr>
+            <p:ph idx="1"/>
+          </p:nvPr>
+        </p:nvSpPr>
+        <p:spPr>
+          <a:xfrm>
+            <a:off x="1295615" y="2565647"/>
+            <a:ext cx="1439231" cy="435006"/>
+          </a:xfrm>
+        </p:spPr>
+        <p:txBody>
+          <a:bodyPr>
+            <a:normAutofit lnSpcReduction="10000"/>
+          </a:bodyPr>
+          <a:lstStyle/>
+          <a:p>
+            <a:pPr marL="0" indent="0">
+              <a:buNone/>
+            </a:pPr>
+            <a:r>
+              <a:rPr lang="nl-BE" dirty="0" err="1"/>
+              <a:t>Heatmap</a:t>
+            </a:r>
+            <a:endParaRPr lang="nl-BE" dirty="0"/>
+          </a:p>
+        </p:txBody>
+      </p:sp>
+      <p:pic>
+        <p:nvPicPr>
+          <p:cNvPr id="8" name="Afbeelding 7">
+            <a:extLst>
+              <a:ext uri="{FF2B5EF4-FFF2-40B4-BE49-F238E27FC236}">
+                <a16:creationId xmlns:a16="http://schemas.microsoft.com/office/drawing/2014/main" id="{EDDA7AEC-1B70-4D8D-82E2-2782672FC429}"/>
+              </a:ext>
+            </a:extLst>
+          </p:cNvPr>
+          <p:cNvPicPr>
+            <a:picLocks noChangeAspect="1"/>
+          </p:cNvPicPr>
+          <p:nvPr/>
+        </p:nvPicPr>
+        <p:blipFill>
+          <a:blip r:embed="rId3"/>
+          <a:stretch>
+            <a:fillRect/>
+          </a:stretch>
+        </p:blipFill>
+        <p:spPr>
+          <a:xfrm>
+            <a:off x="576000" y="3000653"/>
+            <a:ext cx="2950563" cy="1766518"/>
+          </a:xfrm>
+          <a:prstGeom prst="rect">
+            <a:avLst/>
+          </a:prstGeom>
+        </p:spPr>
+      </p:pic>
+      <p:sp>
+        <p:nvSpPr>
+          <p:cNvPr id="9" name="Tekstvak 8">
+            <a:extLst>
+              <a:ext uri="{FF2B5EF4-FFF2-40B4-BE49-F238E27FC236}">
+                <a16:creationId xmlns:a16="http://schemas.microsoft.com/office/drawing/2014/main" id="{DA5B4839-8514-4CFD-9425-197D205DF99F}"/>
+              </a:ext>
+            </a:extLst>
+          </p:cNvPr>
+          <p:cNvSpPr txBox="1"/>
+          <p:nvPr/>
+        </p:nvSpPr>
+        <p:spPr>
+          <a:xfrm>
+            <a:off x="625249" y="4904005"/>
+            <a:ext cx="2852063" cy="369332"/>
+          </a:xfrm>
+          <a:prstGeom prst="rect">
+            <a:avLst/>
+          </a:prstGeom>
+          <a:noFill/>
+        </p:spPr>
+        <p:txBody>
+          <a:bodyPr wrap="none" rtlCol="0">
+            <a:spAutoFit/>
+          </a:bodyPr>
+          <a:lstStyle/>
+          <a:p>
+            <a:r>
+              <a:rPr lang="nl-BE" dirty="0" err="1"/>
+              <a:t>Gain</a:t>
+            </a:r>
+            <a:r>
+              <a:rPr lang="nl-BE" dirty="0"/>
+              <a:t> </a:t>
+            </a:r>
+            <a:r>
+              <a:rPr lang="nl-BE" dirty="0" err="1"/>
+              <a:t>insight</a:t>
+            </a:r>
+            <a:r>
+              <a:rPr lang="nl-BE" dirty="0"/>
+              <a:t> </a:t>
+            </a:r>
+            <a:r>
+              <a:rPr lang="nl-BE" dirty="0" err="1"/>
+              <a:t>into</a:t>
+            </a:r>
+            <a:r>
+              <a:rPr lang="nl-BE" dirty="0"/>
+              <a:t> </a:t>
+            </a:r>
+            <a:r>
+              <a:rPr lang="nl-BE" dirty="0" err="1"/>
+              <a:t>the</a:t>
+            </a:r>
+            <a:r>
+              <a:rPr lang="nl-BE" dirty="0"/>
+              <a:t> </a:t>
+            </a:r>
+            <a:r>
+              <a:rPr lang="nl-BE" dirty="0" err="1"/>
+              <a:t>many</a:t>
+            </a:r>
+            <a:endParaRPr lang="nl-BE" dirty="0"/>
+          </a:p>
+        </p:txBody>
+      </p:sp>
+      <p:pic>
+        <p:nvPicPr>
+          <p:cNvPr id="11" name="Afbeelding 10">
+            <a:extLst>
+              <a:ext uri="{FF2B5EF4-FFF2-40B4-BE49-F238E27FC236}">
+                <a16:creationId xmlns:a16="http://schemas.microsoft.com/office/drawing/2014/main" id="{01086376-87B3-4FA9-B589-5388965B8515}"/>
+              </a:ext>
+            </a:extLst>
+          </p:cNvPr>
+          <p:cNvPicPr>
+            <a:picLocks noChangeAspect="1"/>
+          </p:cNvPicPr>
+          <p:nvPr/>
+        </p:nvPicPr>
+        <p:blipFill rotWithShape="1">
+          <a:blip r:embed="rId4"/>
+          <a:srcRect b="27790"/>
+          <a:stretch/>
+        </p:blipFill>
+        <p:spPr>
+          <a:xfrm>
+            <a:off x="4457333" y="3000653"/>
+            <a:ext cx="3220152" cy="1816759"/>
+          </a:xfrm>
+          <a:prstGeom prst="rect">
+            <a:avLst/>
+          </a:prstGeom>
+        </p:spPr>
+      </p:pic>
+      <p:sp>
+        <p:nvSpPr>
+          <p:cNvPr id="12" name="Tijdelijke aanduiding voor inhoud 6">
+            <a:extLst>
+              <a:ext uri="{FF2B5EF4-FFF2-40B4-BE49-F238E27FC236}">
+                <a16:creationId xmlns:a16="http://schemas.microsoft.com/office/drawing/2014/main" id="{FE0CFAEE-AA5F-43A5-B0A7-ED7CF3735B8C}"/>
+              </a:ext>
+            </a:extLst>
+          </p:cNvPr>
+          <p:cNvSpPr txBox="1">
+            <a:spLocks/>
+          </p:cNvSpPr>
+          <p:nvPr/>
+        </p:nvSpPr>
+        <p:spPr>
+          <a:xfrm>
+            <a:off x="4457333" y="2584362"/>
+            <a:ext cx="3346139" cy="435006"/>
+          </a:xfrm>
+          <a:prstGeom prst="rect">
+            <a:avLst/>
+          </a:prstGeom>
+        </p:spPr>
+        <p:txBody>
+          <a:bodyPr vert="horz" lIns="91440" tIns="45720" rIns="91440" bIns="45720" rtlCol="0">
+            <a:normAutofit lnSpcReduction="10000"/>
+          </a:bodyPr>
+          <a:lstStyle>
+            <a:lvl1pPr marL="228600" indent="-228600" algn="l" defTabSz="914400" rtl="0" eaLnBrk="1" latinLnBrk="0" hangingPunct="1">
+              <a:lnSpc>
+                <a:spcPct val="100000"/>
+              </a:lnSpc>
+              <a:spcBef>
+                <a:spcPts val="1000"/>
+              </a:spcBef>
+              <a:buFont typeface="Arial"/>
+              <a:buChar char="•"/>
+              <a:defRPr sz="2400" kern="1200" baseline="0">
+                <a:solidFill>
+                  <a:schemeClr val="tx1"/>
+                </a:solidFill>
+                <a:latin typeface="Arial" charset="0"/>
+                <a:ea typeface="+mn-ea"/>
+                <a:cs typeface="+mn-cs"/>
+              </a:defRPr>
+            </a:lvl1pPr>
+            <a:lvl2pPr marL="685800" indent="-228600" algn="l" defTabSz="914400" rtl="0" eaLnBrk="1" latinLnBrk="0" hangingPunct="1">
+              <a:lnSpc>
+                <a:spcPct val="100000"/>
+              </a:lnSpc>
+              <a:spcBef>
+                <a:spcPts val="500"/>
+              </a:spcBef>
+              <a:buFont typeface="Arial"/>
+              <a:buChar char="•"/>
+              <a:defRPr sz="2400" kern="1200" baseline="0">
+                <a:solidFill>
+                  <a:schemeClr val="tx1"/>
+                </a:solidFill>
+                <a:latin typeface="Arial" charset="0"/>
+                <a:ea typeface="+mn-ea"/>
+                <a:cs typeface="+mn-cs"/>
+              </a:defRPr>
+            </a:lvl2pPr>
+            <a:lvl3pPr marL="1143000" indent="-228600" algn="l" defTabSz="914400" rtl="0" eaLnBrk="1" latinLnBrk="0" hangingPunct="1">
+              <a:lnSpc>
+                <a:spcPct val="100000"/>
+              </a:lnSpc>
+              <a:spcBef>
+                <a:spcPts val="500"/>
+              </a:spcBef>
+              <a:buFont typeface="Arial"/>
+              <a:buChar char="•"/>
+              <a:defRPr sz="2000" kern="1200" baseline="0">
+                <a:solidFill>
+                  <a:schemeClr val="tx1"/>
+                </a:solidFill>
+                <a:latin typeface="Arial" charset="0"/>
+                <a:ea typeface="+mn-ea"/>
+                <a:cs typeface="+mn-cs"/>
+              </a:defRPr>
+            </a:lvl3pPr>
+            <a:lvl4pPr marL="1600200" indent="-228600" algn="l" defTabSz="914400" rtl="0" eaLnBrk="1" latinLnBrk="0" hangingPunct="1">
+              <a:lnSpc>
+                <a:spcPct val="100000"/>
+              </a:lnSpc>
+              <a:spcBef>
+                <a:spcPts val="500"/>
+              </a:spcBef>
+              <a:buFont typeface="Arial"/>
+              <a:buChar char="•"/>
+              <a:defRPr sz="1800" kern="1200" baseline="0">
+                <a:solidFill>
+                  <a:schemeClr val="tx1"/>
+                </a:solidFill>
+                <a:latin typeface="Arial" charset="0"/>
+                <a:ea typeface="+mn-ea"/>
+                <a:cs typeface="+mn-cs"/>
+              </a:defRPr>
+            </a:lvl4pPr>
+            <a:lvl5pPr marL="2057400" indent="-228600" algn="l" defTabSz="914400" rtl="0" eaLnBrk="1" latinLnBrk="0" hangingPunct="1">
+              <a:lnSpc>
+                <a:spcPct val="100000"/>
+              </a:lnSpc>
+              <a:spcBef>
+                <a:spcPts val="500"/>
+              </a:spcBef>
+              <a:buFont typeface="Arial"/>
+              <a:buChar char="•"/>
+              <a:defRPr sz="1800" kern="1200" baseline="0">
+                <a:solidFill>
+                  <a:schemeClr val="tx1"/>
+                </a:solidFill>
+                <a:latin typeface="Arial" charset="0"/>
+                <a:ea typeface="+mn-ea"/>
+                <a:cs typeface="+mn-cs"/>
+              </a:defRPr>
+            </a:lvl5pPr>
+            <a:lvl6pPr marL="2514600" indent="-228600" algn="l" defTabSz="914400" rtl="0" eaLnBrk="1" latinLnBrk="0" hangingPunct="1">
+              <a:lnSpc>
+                <a:spcPct val="90000"/>
+              </a:lnSpc>
+              <a:spcBef>
+                <a:spcPts val="500"/>
+              </a:spcBef>
+              <a:buFont typeface="Arial"/>
+              <a:buChar char="•"/>
+              <a:defRPr sz="1800" kern="1200">
+                <a:solidFill>
+                  <a:schemeClr val="tx1"/>
+                </a:solidFill>
+                <a:latin typeface="+mn-lt"/>
+                <a:ea typeface="+mn-ea"/>
+                <a:cs typeface="+mn-cs"/>
+              </a:defRPr>
+            </a:lvl6pPr>
+            <a:lvl7pPr marL="2971800" indent="-228600" algn="l" defTabSz="914400" rtl="0" eaLnBrk="1" latinLnBrk="0" hangingPunct="1">
+              <a:lnSpc>
+                <a:spcPct val="90000"/>
+              </a:lnSpc>
+              <a:spcBef>
+                <a:spcPts val="500"/>
+              </a:spcBef>
+              <a:buFont typeface="Arial"/>
+              <a:buChar char="•"/>
+              <a:defRPr sz="1800" kern="1200">
+                <a:solidFill>
+                  <a:schemeClr val="tx1"/>
+                </a:solidFill>
+                <a:latin typeface="+mn-lt"/>
+                <a:ea typeface="+mn-ea"/>
+                <a:cs typeface="+mn-cs"/>
+              </a:defRPr>
+            </a:lvl7pPr>
+            <a:lvl8pPr marL="3429000" indent="-228600" algn="l" defTabSz="914400" rtl="0" eaLnBrk="1" latinLnBrk="0" hangingPunct="1">
+              <a:lnSpc>
+                <a:spcPct val="90000"/>
+              </a:lnSpc>
+              <a:spcBef>
+                <a:spcPts val="500"/>
+              </a:spcBef>
+              <a:buFont typeface="Arial"/>
+              <a:buChar char="•"/>
+              <a:defRPr sz="1800" kern="1200">
+                <a:solidFill>
+                  <a:schemeClr val="tx1"/>
+                </a:solidFill>
+                <a:latin typeface="+mn-lt"/>
+                <a:ea typeface="+mn-ea"/>
+                <a:cs typeface="+mn-cs"/>
+              </a:defRPr>
+            </a:lvl8pPr>
+            <a:lvl9pPr marL="3886200" indent="-228600" algn="l" defTabSz="914400" rtl="0" eaLnBrk="1" latinLnBrk="0" hangingPunct="1">
+              <a:lnSpc>
+                <a:spcPct val="90000"/>
+              </a:lnSpc>
+              <a:spcBef>
+                <a:spcPts val="500"/>
+              </a:spcBef>
+              <a:buFont typeface="Arial"/>
+              <a:buChar char="•"/>
+              <a:defRPr sz="1800" kern="1200">
+                <a:solidFill>
+                  <a:schemeClr val="tx1"/>
+                </a:solidFill>
+                <a:latin typeface="+mn-lt"/>
+                <a:ea typeface="+mn-ea"/>
+                <a:cs typeface="+mn-cs"/>
+              </a:defRPr>
+            </a:lvl9pPr>
+          </a:lstStyle>
+          <a:p>
+            <a:pPr marL="0" indent="0">
+              <a:buFont typeface="Arial"/>
+              <a:buNone/>
+            </a:pPr>
+            <a:r>
+              <a:rPr lang="nl-BE" dirty="0" err="1"/>
+              <a:t>Individual</a:t>
+            </a:r>
+            <a:r>
+              <a:rPr lang="nl-BE" dirty="0"/>
+              <a:t> Routes</a:t>
+            </a:r>
+          </a:p>
+        </p:txBody>
+      </p:sp>
+      <p:sp>
+        <p:nvSpPr>
+          <p:cNvPr id="13" name="Tekstvak 12">
+            <a:extLst>
+              <a:ext uri="{FF2B5EF4-FFF2-40B4-BE49-F238E27FC236}">
+                <a16:creationId xmlns:a16="http://schemas.microsoft.com/office/drawing/2014/main" id="{8FA940B0-BA38-4206-B899-5CE6F9D74942}"/>
+              </a:ext>
+            </a:extLst>
+          </p:cNvPr>
+          <p:cNvSpPr txBox="1"/>
+          <p:nvPr/>
+        </p:nvSpPr>
+        <p:spPr>
+          <a:xfrm>
+            <a:off x="4772561" y="4900138"/>
+            <a:ext cx="2646878" cy="369332"/>
+          </a:xfrm>
+          <a:prstGeom prst="rect">
+            <a:avLst/>
+          </a:prstGeom>
+          <a:noFill/>
+        </p:spPr>
+        <p:txBody>
+          <a:bodyPr wrap="none" rtlCol="0">
+            <a:spAutoFit/>
+          </a:bodyPr>
+          <a:lstStyle/>
+          <a:p>
+            <a:r>
+              <a:rPr lang="nl-BE" dirty="0" err="1"/>
+              <a:t>Gain</a:t>
+            </a:r>
+            <a:r>
+              <a:rPr lang="nl-BE" dirty="0"/>
+              <a:t> </a:t>
+            </a:r>
+            <a:r>
+              <a:rPr lang="nl-BE" dirty="0" err="1"/>
+              <a:t>insight</a:t>
+            </a:r>
+            <a:r>
+              <a:rPr lang="nl-BE" dirty="0"/>
+              <a:t> </a:t>
+            </a:r>
+            <a:r>
+              <a:rPr lang="nl-BE" dirty="0" err="1"/>
+              <a:t>into</a:t>
+            </a:r>
+            <a:r>
+              <a:rPr lang="nl-BE" dirty="0"/>
+              <a:t> </a:t>
+            </a:r>
+            <a:r>
+              <a:rPr lang="nl-BE" dirty="0" err="1"/>
+              <a:t>the</a:t>
+            </a:r>
+            <a:r>
+              <a:rPr lang="nl-BE" dirty="0"/>
+              <a:t> few</a:t>
             </a:r>
           </a:p>
         </p:txBody>
@@ -6957,7 +8079,7 @@
           <a:p>
             <a:r>
               <a:rPr lang="en-US" dirty="0">
-                <a:hlinkClick r:id="rId2"/>
+                <a:hlinkClick r:id="rId3"/>
               </a:rPr>
               <a:t>http://iv.kul/acopy.html</a:t>
             </a:r>

</xml_diff>